<commit_message>
POPL: update schedule and slide
</commit_message>
<xml_diff>
--- a/courses/popl/slides/lec18-type-reconstruct.pptx
+++ b/courses/popl/slides/lec18-type-reconstruct.pptx
@@ -5,7 +5,7 @@
     <p:sldMasterId id="2147483649" r:id="rId1"/>
   </p:sldMasterIdLst>
   <p:handoutMasterIdLst>
-    <p:handoutMasterId r:id="rId21"/>
+    <p:handoutMasterId r:id="rId22"/>
   </p:handoutMasterIdLst>
   <p:sldIdLst>
     <p:sldId id="256" r:id="rId2"/>
@@ -25,8 +25,9 @@
     <p:sldId id="439" r:id="rId16"/>
     <p:sldId id="467" r:id="rId17"/>
     <p:sldId id="468" r:id="rId18"/>
-    <p:sldId id="470" r:id="rId19"/>
-    <p:sldId id="425" r:id="rId20"/>
+    <p:sldId id="472" r:id="rId19"/>
+    <p:sldId id="470" r:id="rId20"/>
+    <p:sldId id="425" r:id="rId21"/>
   </p:sldIdLst>
   <p:sldSz cx="9144000" cy="6858000" type="screen4x3"/>
   <p:notesSz cx="7099300" cy="10234613"/>
@@ -6604,7 +6605,7 @@
           <a:p>
             <a:r>
               <a:rPr lang="en-US" altLang="zh-CN" dirty="0"/>
-              <a:t>Value</a:t>
+              <a:t>To</a:t>
             </a:r>
             <a:r>
               <a:rPr lang="zh-CN" altLang="en-US" dirty="0"/>
@@ -6612,7 +6613,15 @@
             </a:r>
             <a:r>
               <a:rPr lang="en-US" altLang="zh-CN" dirty="0"/>
-              <a:t>restriction</a:t>
+              <a:t>check:</a:t>
+            </a:r>
+            <a:r>
+              <a:rPr lang="zh-CN" altLang="en-US" dirty="0"/>
+              <a:t> </a:t>
+            </a:r>
+            <a:r>
+              <a:rPr lang="en-US" altLang="zh-CN" dirty="0"/>
+              <a:t>let x=t1 in t2</a:t>
             </a:r>
             <a:endParaRPr kumimoji="1" lang="en-US" altLang="zh-CN" dirty="0"/>
           </a:p>
@@ -6620,10 +6629,10 @@
       </p:sp>
       <p:pic>
         <p:nvPicPr>
-          <p:cNvPr id="7" name="图片 6">
-            <a:extLst>
-              <a:ext uri="{FF2B5EF4-FFF2-40B4-BE49-F238E27FC236}">
-                <a16:creationId xmlns:a16="http://schemas.microsoft.com/office/drawing/2014/main" id="{2534DE7B-18DF-4041-9782-87610D019F73}"/>
+          <p:cNvPr id="4" name="图片 3">
+            <a:extLst>
+              <a:ext uri="{FF2B5EF4-FFF2-40B4-BE49-F238E27FC236}">
+                <a16:creationId xmlns:a16="http://schemas.microsoft.com/office/drawing/2014/main" id="{63492E6C-4DBC-C243-B536-F6C5A13722BE}"/>
               </a:ext>
             </a:extLst>
           </p:cNvPr>
@@ -6640,246 +6649,18 @@
         </p:blipFill>
         <p:spPr>
           <a:xfrm>
-            <a:off x="1447800" y="2362200"/>
-            <a:ext cx="4203700" cy="787400"/>
+            <a:off x="647700" y="2305050"/>
+            <a:ext cx="7848600" cy="2247900"/>
           </a:xfrm>
           <a:prstGeom prst="rect">
             <a:avLst/>
           </a:prstGeom>
         </p:spPr>
       </p:pic>
-      <p:sp>
-        <p:nvSpPr>
-          <p:cNvPr id="8" name="文本框 7">
-            <a:extLst>
-              <a:ext uri="{FF2B5EF4-FFF2-40B4-BE49-F238E27FC236}">
-                <a16:creationId xmlns:a16="http://schemas.microsoft.com/office/drawing/2014/main" id="{7AA6F5E1-AACF-954D-8634-4EC16F8BC050}"/>
-              </a:ext>
-            </a:extLst>
-          </p:cNvPr>
-          <p:cNvSpPr txBox="1"/>
-          <p:nvPr/>
-        </p:nvSpPr>
-        <p:spPr>
-          <a:xfrm>
-            <a:off x="1828800" y="3429000"/>
-            <a:ext cx="4114800" cy="1200329"/>
-          </a:xfrm>
-          <a:prstGeom prst="rect">
-            <a:avLst/>
-          </a:prstGeom>
-          <a:noFill/>
-        </p:spPr>
-        <p:txBody>
-          <a:bodyPr wrap="square" rtlCol="0">
-            <a:spAutoFit/>
-          </a:bodyPr>
-          <a:lstStyle/>
-          <a:p>
-            <a:r>
-              <a:rPr kumimoji="1" lang="en-US" altLang="zh-CN" dirty="0">
-                <a:solidFill>
-                  <a:srgbClr val="0432FF"/>
-                </a:solidFill>
-              </a:rPr>
-              <a:t>let</a:t>
-            </a:r>
-            <a:r>
-              <a:rPr kumimoji="1" lang="zh-CN" altLang="en-US" dirty="0">
-                <a:solidFill>
-                  <a:srgbClr val="0432FF"/>
-                </a:solidFill>
-              </a:rPr>
-              <a:t> </a:t>
-            </a:r>
-            <a:r>
-              <a:rPr kumimoji="1" lang="en-US" altLang="zh-CN" dirty="0">
-                <a:solidFill>
-                  <a:srgbClr val="0432FF"/>
-                </a:solidFill>
-              </a:rPr>
-              <a:t>x</a:t>
-            </a:r>
-            <a:r>
-              <a:rPr kumimoji="1" lang="zh-CN" altLang="en-US" dirty="0">
-                <a:solidFill>
-                  <a:srgbClr val="0432FF"/>
-                </a:solidFill>
-              </a:rPr>
-              <a:t> </a:t>
-            </a:r>
-            <a:r>
-              <a:rPr kumimoji="1" lang="en-US" altLang="zh-CN" dirty="0">
-                <a:solidFill>
-                  <a:srgbClr val="0432FF"/>
-                </a:solidFill>
-              </a:rPr>
-              <a:t>=</a:t>
-            </a:r>
-            <a:r>
-              <a:rPr kumimoji="1" lang="zh-CN" altLang="en-US" dirty="0">
-                <a:solidFill>
-                  <a:srgbClr val="0432FF"/>
-                </a:solidFill>
-              </a:rPr>
-              <a:t> </a:t>
-            </a:r>
-            <a:r>
-              <a:rPr kumimoji="1" lang="en-US" altLang="zh-CN" dirty="0">
-                <a:solidFill>
-                  <a:srgbClr val="0432FF"/>
-                </a:solidFill>
-              </a:rPr>
-              <a:t>t1</a:t>
-            </a:r>
-            <a:r>
-              <a:rPr kumimoji="1" lang="zh-CN" altLang="en-US" dirty="0">
-                <a:solidFill>
-                  <a:srgbClr val="0432FF"/>
-                </a:solidFill>
-              </a:rPr>
-              <a:t> </a:t>
-            </a:r>
-            <a:r>
-              <a:rPr kumimoji="1" lang="en-US" altLang="zh-CN" dirty="0">
-                <a:solidFill>
-                  <a:srgbClr val="0432FF"/>
-                </a:solidFill>
-              </a:rPr>
-              <a:t>in</a:t>
-            </a:r>
-            <a:r>
-              <a:rPr kumimoji="1" lang="zh-CN" altLang="en-US" dirty="0">
-                <a:solidFill>
-                  <a:srgbClr val="0432FF"/>
-                </a:solidFill>
-              </a:rPr>
-              <a:t> </a:t>
-            </a:r>
-            <a:r>
-              <a:rPr kumimoji="1" lang="en-US" altLang="zh-CN" dirty="0">
-                <a:solidFill>
-                  <a:srgbClr val="0432FF"/>
-                </a:solidFill>
-              </a:rPr>
-              <a:t>t2:</a:t>
-            </a:r>
-          </a:p>
-          <a:p>
-            <a:endParaRPr kumimoji="1" lang="en-US" altLang="zh-CN" dirty="0"/>
-          </a:p>
-          <a:p>
-            <a:r>
-              <a:rPr kumimoji="1" lang="en-US" altLang="zh-CN" dirty="0"/>
-              <a:t>The</a:t>
-            </a:r>
-            <a:r>
-              <a:rPr kumimoji="1" lang="zh-CN" altLang="en-US" dirty="0"/>
-              <a:t> </a:t>
-            </a:r>
-            <a:r>
-              <a:rPr kumimoji="1" lang="en-US" altLang="zh-CN" dirty="0"/>
-              <a:t>right</a:t>
-            </a:r>
-            <a:r>
-              <a:rPr kumimoji="1" lang="zh-CN" altLang="en-US" dirty="0"/>
-              <a:t> </a:t>
-            </a:r>
-            <a:r>
-              <a:rPr kumimoji="1" lang="en-US" altLang="zh-CN" dirty="0"/>
-              <a:t>hand</a:t>
-            </a:r>
-            <a:r>
-              <a:rPr kumimoji="1" lang="zh-CN" altLang="en-US" dirty="0"/>
-              <a:t> </a:t>
-            </a:r>
-            <a:r>
-              <a:rPr kumimoji="1" lang="en-US" altLang="zh-CN" dirty="0"/>
-              <a:t>t2</a:t>
-            </a:r>
-            <a:r>
-              <a:rPr kumimoji="1" lang="zh-CN" altLang="en-US" dirty="0"/>
-              <a:t> </a:t>
-            </a:r>
-            <a:r>
-              <a:rPr kumimoji="1" lang="en-US" altLang="zh-CN" dirty="0"/>
-              <a:t>should</a:t>
-            </a:r>
-            <a:r>
-              <a:rPr kumimoji="1" lang="zh-CN" altLang="en-US" dirty="0"/>
-              <a:t> </a:t>
-            </a:r>
-            <a:r>
-              <a:rPr kumimoji="1" lang="en-US" altLang="zh-CN" dirty="0"/>
-              <a:t>be</a:t>
-            </a:r>
-            <a:r>
-              <a:rPr kumimoji="1" lang="zh-CN" altLang="en-US" dirty="0"/>
-              <a:t> </a:t>
-            </a:r>
-            <a:r>
-              <a:rPr kumimoji="1" lang="en-US" altLang="zh-CN" dirty="0"/>
-              <a:t>a</a:t>
-            </a:r>
-            <a:r>
-              <a:rPr kumimoji="1" lang="zh-CN" altLang="en-US" dirty="0"/>
-              <a:t> </a:t>
-            </a:r>
-            <a:r>
-              <a:rPr kumimoji="1" lang="en-US" altLang="zh-CN" dirty="0"/>
-              <a:t>syntactic</a:t>
-            </a:r>
-            <a:r>
-              <a:rPr kumimoji="1" lang="zh-CN" altLang="en-US" dirty="0"/>
-              <a:t> </a:t>
-            </a:r>
-            <a:r>
-              <a:rPr kumimoji="1" lang="en-US" altLang="zh-CN" dirty="0">
-                <a:solidFill>
-                  <a:srgbClr val="0432FF"/>
-                </a:solidFill>
-              </a:rPr>
-              <a:t>value</a:t>
-            </a:r>
-            <a:r>
-              <a:rPr kumimoji="1" lang="en-US" altLang="zh-CN" dirty="0"/>
-              <a:t>,</a:t>
-            </a:r>
-            <a:r>
-              <a:rPr kumimoji="1" lang="zh-CN" altLang="en-US" dirty="0"/>
-              <a:t> </a:t>
-            </a:r>
-            <a:r>
-              <a:rPr kumimoji="1" lang="en-US" altLang="zh-CN" dirty="0"/>
-              <a:t>to</a:t>
-            </a:r>
-            <a:r>
-              <a:rPr kumimoji="1" lang="zh-CN" altLang="en-US" dirty="0"/>
-              <a:t> </a:t>
-            </a:r>
-            <a:r>
-              <a:rPr kumimoji="1" lang="en-US" altLang="zh-CN" dirty="0"/>
-              <a:t>be</a:t>
-            </a:r>
-            <a:r>
-              <a:rPr kumimoji="1" lang="zh-CN" altLang="en-US" dirty="0"/>
-              <a:t> </a:t>
-            </a:r>
-            <a:r>
-              <a:rPr kumimoji="1" lang="en-US" altLang="zh-CN" dirty="0"/>
-              <a:t>generalized.</a:t>
-            </a:r>
-            <a:r>
-              <a:rPr kumimoji="1" lang="zh-CN" altLang="en-US" dirty="0"/>
-              <a:t> </a:t>
-            </a:r>
-          </a:p>
-        </p:txBody>
-      </p:sp>
     </p:spTree>
     <p:extLst>
       <p:ext uri="{BB962C8B-B14F-4D97-AF65-F5344CB8AC3E}">
-        <p14:creationId xmlns:p14="http://schemas.microsoft.com/office/powerpoint/2010/main" val="233872336"/>
+        <p14:creationId xmlns:p14="http://schemas.microsoft.com/office/powerpoint/2010/main" val="1283152112"/>
       </p:ext>
     </p:extLst>
   </p:cSld>
@@ -6911,7 +6692,7 @@
           <p:cNvPr id="2" name="标题 1">
             <a:extLst>
               <a:ext uri="{FF2B5EF4-FFF2-40B4-BE49-F238E27FC236}">
-                <a16:creationId xmlns:a16="http://schemas.microsoft.com/office/drawing/2014/main" id="{91A7BC32-210A-B647-A3FC-FBFCA80FC6BA}"/>
+                <a16:creationId xmlns:a16="http://schemas.microsoft.com/office/drawing/2014/main" id="{0A75F11F-C78A-904E-AB8C-72A70AF2A0A3}"/>
               </a:ext>
             </a:extLst>
           </p:cNvPr>
@@ -6928,61 +6709,247 @@
           <a:lstStyle/>
           <a:p>
             <a:r>
-              <a:rPr kumimoji="1" lang="en-US" altLang="zh-CN" dirty="0"/>
-              <a:t>Summary</a:t>
-            </a:r>
-            <a:endParaRPr kumimoji="1" lang="zh-CN" altLang="en-US" dirty="0"/>
+              <a:rPr lang="en-US" altLang="zh-CN" dirty="0"/>
+              <a:t>Value</a:t>
+            </a:r>
+            <a:r>
+              <a:rPr lang="zh-CN" altLang="en-US" dirty="0"/>
+              <a:t> </a:t>
+            </a:r>
+            <a:r>
+              <a:rPr lang="en-US" altLang="zh-CN" dirty="0"/>
+              <a:t>restriction</a:t>
+            </a:r>
+            <a:endParaRPr kumimoji="1" lang="en-US" altLang="zh-CN" dirty="0"/>
           </a:p>
         </p:txBody>
       </p:sp>
+      <p:pic>
+        <p:nvPicPr>
+          <p:cNvPr id="7" name="图片 6">
+            <a:extLst>
+              <a:ext uri="{FF2B5EF4-FFF2-40B4-BE49-F238E27FC236}">
+                <a16:creationId xmlns:a16="http://schemas.microsoft.com/office/drawing/2014/main" id="{2534DE7B-18DF-4041-9782-87610D019F73}"/>
+              </a:ext>
+            </a:extLst>
+          </p:cNvPr>
+          <p:cNvPicPr>
+            <a:picLocks noChangeAspect="1"/>
+          </p:cNvPicPr>
+          <p:nvPr/>
+        </p:nvPicPr>
+        <p:blipFill>
+          <a:blip r:embed="rId2"/>
+          <a:stretch>
+            <a:fillRect/>
+          </a:stretch>
+        </p:blipFill>
+        <p:spPr>
+          <a:xfrm>
+            <a:off x="1447800" y="2362200"/>
+            <a:ext cx="4203700" cy="787400"/>
+          </a:xfrm>
+          <a:prstGeom prst="rect">
+            <a:avLst/>
+          </a:prstGeom>
+        </p:spPr>
+      </p:pic>
       <p:sp>
         <p:nvSpPr>
-          <p:cNvPr id="3" name="内容占位符 2">
-            <a:extLst>
-              <a:ext uri="{FF2B5EF4-FFF2-40B4-BE49-F238E27FC236}">
-                <a16:creationId xmlns:a16="http://schemas.microsoft.com/office/drawing/2014/main" id="{55A1BAFE-BD59-DA43-AA9F-E62E3841C011}"/>
-              </a:ext>
-            </a:extLst>
-          </p:cNvPr>
-          <p:cNvSpPr>
-            <a:spLocks noGrp="1"/>
-          </p:cNvSpPr>
-          <p:nvPr>
-            <p:ph idx="1"/>
-          </p:nvPr>
+          <p:cNvPr id="8" name="文本框 7">
+            <a:extLst>
+              <a:ext uri="{FF2B5EF4-FFF2-40B4-BE49-F238E27FC236}">
+                <a16:creationId xmlns:a16="http://schemas.microsoft.com/office/drawing/2014/main" id="{7AA6F5E1-AACF-954D-8634-4EC16F8BC050}"/>
+              </a:ext>
+            </a:extLst>
+          </p:cNvPr>
+          <p:cNvSpPr txBox="1"/>
+          <p:nvPr/>
         </p:nvSpPr>
-        <p:spPr/>
+        <p:spPr>
+          <a:xfrm>
+            <a:off x="1828800" y="3429000"/>
+            <a:ext cx="4114800" cy="1200329"/>
+          </a:xfrm>
+          <a:prstGeom prst="rect">
+            <a:avLst/>
+          </a:prstGeom>
+          <a:noFill/>
+        </p:spPr>
         <p:txBody>
-          <a:bodyPr/>
+          <a:bodyPr wrap="square" rtlCol="0">
+            <a:spAutoFit/>
+          </a:bodyPr>
           <a:lstStyle/>
           <a:p>
             <a:r>
-              <a:rPr kumimoji="1" lang="en-US" altLang="zh-CN" dirty="0"/>
-              <a:t>Type</a:t>
-            </a:r>
-            <a:r>
-              <a:rPr kumimoji="1" lang="zh-CN" altLang="en-US" dirty="0"/>
-              <a:t> </a:t>
-            </a:r>
-            <a:r>
-              <a:rPr kumimoji="1" lang="en-US" altLang="zh-CN" dirty="0"/>
-              <a:t>reconstruction</a:t>
-            </a:r>
-            <a:r>
-              <a:rPr kumimoji="1" lang="zh-CN" altLang="en-US" dirty="0"/>
-              <a:t> </a:t>
-            </a:r>
-            <a:r>
-              <a:rPr kumimoji="1" lang="en-US" altLang="zh-CN" dirty="0"/>
-              <a:t>assigns</a:t>
-            </a:r>
-            <a:r>
-              <a:rPr kumimoji="1" lang="zh-CN" altLang="en-US" dirty="0"/>
-              <a:t> </a:t>
-            </a:r>
-            <a:r>
-              <a:rPr kumimoji="1" lang="en-US" altLang="zh-CN" dirty="0"/>
-              <a:t>types</a:t>
+              <a:rPr kumimoji="1" lang="en-US" altLang="zh-CN" dirty="0">
+                <a:solidFill>
+                  <a:srgbClr val="0432FF"/>
+                </a:solidFill>
+              </a:rPr>
+              <a:t>let</a:t>
+            </a:r>
+            <a:r>
+              <a:rPr kumimoji="1" lang="zh-CN" altLang="en-US" dirty="0">
+                <a:solidFill>
+                  <a:srgbClr val="0432FF"/>
+                </a:solidFill>
+              </a:rPr>
+              <a:t> </a:t>
+            </a:r>
+            <a:r>
+              <a:rPr kumimoji="1" lang="en-US" altLang="zh-CN" dirty="0">
+                <a:solidFill>
+                  <a:srgbClr val="0432FF"/>
+                </a:solidFill>
+              </a:rPr>
+              <a:t>x</a:t>
+            </a:r>
+            <a:r>
+              <a:rPr kumimoji="1" lang="zh-CN" altLang="en-US" dirty="0">
+                <a:solidFill>
+                  <a:srgbClr val="0432FF"/>
+                </a:solidFill>
+              </a:rPr>
+              <a:t> </a:t>
+            </a:r>
+            <a:r>
+              <a:rPr kumimoji="1" lang="en-US" altLang="zh-CN" dirty="0">
+                <a:solidFill>
+                  <a:srgbClr val="0432FF"/>
+                </a:solidFill>
+              </a:rPr>
+              <a:t>=</a:t>
+            </a:r>
+            <a:r>
+              <a:rPr kumimoji="1" lang="zh-CN" altLang="en-US" dirty="0">
+                <a:solidFill>
+                  <a:srgbClr val="0432FF"/>
+                </a:solidFill>
+              </a:rPr>
+              <a:t> </a:t>
+            </a:r>
+            <a:r>
+              <a:rPr kumimoji="1" lang="en-US" altLang="zh-CN" dirty="0">
+                <a:solidFill>
+                  <a:srgbClr val="0432FF"/>
+                </a:solidFill>
+              </a:rPr>
+              <a:t>t1</a:t>
+            </a:r>
+            <a:r>
+              <a:rPr kumimoji="1" lang="zh-CN" altLang="en-US" dirty="0">
+                <a:solidFill>
+                  <a:srgbClr val="0432FF"/>
+                </a:solidFill>
+              </a:rPr>
+              <a:t> </a:t>
+            </a:r>
+            <a:r>
+              <a:rPr kumimoji="1" lang="en-US" altLang="zh-CN" dirty="0">
+                <a:solidFill>
+                  <a:srgbClr val="0432FF"/>
+                </a:solidFill>
+              </a:rPr>
+              <a:t>in</a:t>
+            </a:r>
+            <a:r>
+              <a:rPr kumimoji="1" lang="zh-CN" altLang="en-US" dirty="0">
+                <a:solidFill>
+                  <a:srgbClr val="0432FF"/>
+                </a:solidFill>
+              </a:rPr>
+              <a:t> </a:t>
+            </a:r>
+            <a:r>
+              <a:rPr kumimoji="1" lang="en-US" altLang="zh-CN" dirty="0">
+                <a:solidFill>
+                  <a:srgbClr val="0432FF"/>
+                </a:solidFill>
+              </a:rPr>
+              <a:t>t2:</a:t>
+            </a:r>
+          </a:p>
+          <a:p>
+            <a:endParaRPr kumimoji="1" lang="en-US" altLang="zh-CN" dirty="0"/>
+          </a:p>
+          <a:p>
+            <a:r>
+              <a:rPr kumimoji="1" lang="en-US" altLang="zh-CN" dirty="0"/>
+              <a:t>The</a:t>
+            </a:r>
+            <a:r>
+              <a:rPr kumimoji="1" lang="zh-CN" altLang="en-US" dirty="0"/>
+              <a:t> </a:t>
+            </a:r>
+            <a:r>
+              <a:rPr kumimoji="1" lang="en-US" altLang="zh-CN" dirty="0"/>
+              <a:t>right</a:t>
+            </a:r>
+            <a:r>
+              <a:rPr kumimoji="1" lang="zh-CN" altLang="en-US" dirty="0"/>
+              <a:t> </a:t>
+            </a:r>
+            <a:r>
+              <a:rPr kumimoji="1" lang="en-US" altLang="zh-CN" dirty="0"/>
+              <a:t>hand</a:t>
+            </a:r>
+            <a:r>
+              <a:rPr kumimoji="1" lang="zh-CN" altLang="en-US" dirty="0"/>
+              <a:t> </a:t>
+            </a:r>
+            <a:r>
+              <a:rPr kumimoji="1" lang="en-US" altLang="zh-CN" dirty="0"/>
+              <a:t>t2</a:t>
+            </a:r>
+            <a:r>
+              <a:rPr kumimoji="1" lang="zh-CN" altLang="en-US" dirty="0"/>
+              <a:t> </a:t>
+            </a:r>
+            <a:r>
+              <a:rPr kumimoji="1" lang="en-US" altLang="zh-CN" dirty="0"/>
+              <a:t>should</a:t>
+            </a:r>
+            <a:r>
+              <a:rPr kumimoji="1" lang="zh-CN" altLang="en-US" dirty="0"/>
+              <a:t> </a:t>
+            </a:r>
+            <a:r>
+              <a:rPr kumimoji="1" lang="en-US" altLang="zh-CN" dirty="0"/>
+              <a:t>be</a:t>
+            </a:r>
+            <a:r>
+              <a:rPr kumimoji="1" lang="zh-CN" altLang="en-US" dirty="0"/>
+              <a:t> </a:t>
+            </a:r>
+            <a:r>
+              <a:rPr kumimoji="1" lang="en-US" altLang="zh-CN" dirty="0"/>
+              <a:t>a</a:t>
+            </a:r>
+            <a:r>
+              <a:rPr kumimoji="1" lang="zh-CN" altLang="en-US" dirty="0"/>
+              <a:t> </a:t>
+            </a:r>
+            <a:r>
+              <a:rPr kumimoji="1" lang="en-US" altLang="zh-CN" dirty="0"/>
+              <a:t>syntactic</a:t>
+            </a:r>
+            <a:r>
+              <a:rPr kumimoji="1" lang="zh-CN" altLang="en-US" dirty="0"/>
+              <a:t> </a:t>
+            </a:r>
+            <a:r>
+              <a:rPr kumimoji="1" lang="en-US" altLang="zh-CN" dirty="0">
+                <a:solidFill>
+                  <a:srgbClr val="0432FF"/>
+                </a:solidFill>
+              </a:rPr>
+              <a:t>value</a:t>
+            </a:r>
+            <a:r>
+              <a:rPr kumimoji="1" lang="en-US" altLang="zh-CN" dirty="0"/>
+              <a:t>,</a:t>
             </a:r>
             <a:r>
               <a:rPr kumimoji="1" lang="zh-CN" altLang="en-US" dirty="0"/>
@@ -6998,139 +6965,19 @@
             </a:r>
             <a:r>
               <a:rPr kumimoji="1" lang="en-US" altLang="zh-CN" dirty="0"/>
-              <a:t>type</a:t>
-            </a:r>
-            <a:r>
-              <a:rPr kumimoji="1" lang="zh-CN" altLang="en-US" dirty="0"/>
-              <a:t> </a:t>
-            </a:r>
-            <a:r>
-              <a:rPr kumimoji="1" lang="en-US" altLang="zh-CN" dirty="0"/>
-              <a:t>variables</a:t>
-            </a:r>
-          </a:p>
-          <a:p>
-            <a:r>
-              <a:rPr kumimoji="1" lang="en-US" altLang="zh-CN" dirty="0"/>
-              <a:t>Type</a:t>
-            </a:r>
-            <a:r>
-              <a:rPr kumimoji="1" lang="zh-CN" altLang="en-US" dirty="0"/>
-              <a:t> </a:t>
-            </a:r>
-            <a:r>
-              <a:rPr kumimoji="1" lang="en-US" altLang="zh-CN" dirty="0"/>
-              <a:t>inference</a:t>
-            </a:r>
-            <a:r>
-              <a:rPr kumimoji="1" lang="zh-CN" altLang="en-US" dirty="0"/>
-              <a:t> </a:t>
-            </a:r>
-            <a:r>
-              <a:rPr kumimoji="1" lang="en-US" altLang="zh-CN" dirty="0"/>
-              <a:t>infer</a:t>
-            </a:r>
-            <a:r>
-              <a:rPr kumimoji="1" lang="zh-CN" altLang="en-US" dirty="0"/>
-              <a:t> </a:t>
-            </a:r>
-            <a:r>
-              <a:rPr kumimoji="1" lang="en-US" altLang="zh-CN" dirty="0"/>
-              <a:t>(most</a:t>
-            </a:r>
-            <a:r>
-              <a:rPr kumimoji="1" lang="zh-CN" altLang="en-US" dirty="0"/>
-              <a:t> </a:t>
-            </a:r>
-            <a:r>
-              <a:rPr kumimoji="1" lang="en-US" altLang="zh-CN" dirty="0"/>
-              <a:t>general)</a:t>
-            </a:r>
-            <a:r>
-              <a:rPr kumimoji="1" lang="zh-CN" altLang="en-US" dirty="0"/>
-              <a:t> </a:t>
-            </a:r>
-            <a:r>
-              <a:rPr kumimoji="1" lang="en-US" altLang="zh-CN" dirty="0"/>
-              <a:t>types</a:t>
-            </a:r>
-            <a:r>
-              <a:rPr kumimoji="1" lang="zh-CN" altLang="en-US" dirty="0"/>
-              <a:t> </a:t>
-            </a:r>
-            <a:r>
-              <a:rPr kumimoji="1" lang="en-US" altLang="zh-CN" dirty="0"/>
-              <a:t>for</a:t>
-            </a:r>
-            <a:r>
-              <a:rPr kumimoji="1" lang="zh-CN" altLang="en-US" dirty="0"/>
-              <a:t> </a:t>
-            </a:r>
-            <a:r>
-              <a:rPr kumimoji="1" lang="en-US" altLang="zh-CN" dirty="0"/>
-              <a:t>untyped</a:t>
-            </a:r>
-            <a:r>
-              <a:rPr kumimoji="1" lang="zh-CN" altLang="en-US" dirty="0"/>
-              <a:t> </a:t>
-            </a:r>
-            <a:r>
-              <a:rPr kumimoji="1" lang="en-US" altLang="zh-CN" dirty="0"/>
-              <a:t>programs</a:t>
-            </a:r>
-          </a:p>
-          <a:p>
-            <a:r>
-              <a:rPr kumimoji="1" lang="en-US" altLang="zh-CN" dirty="0"/>
-              <a:t>Both</a:t>
-            </a:r>
-            <a:r>
-              <a:rPr kumimoji="1" lang="zh-CN" altLang="en-US" dirty="0"/>
-              <a:t> </a:t>
-            </a:r>
-            <a:r>
-              <a:rPr kumimoji="1" lang="en-US" altLang="zh-CN" dirty="0"/>
-              <a:t>are</a:t>
-            </a:r>
-            <a:r>
-              <a:rPr kumimoji="1" lang="zh-CN" altLang="en-US" dirty="0"/>
-              <a:t> </a:t>
-            </a:r>
-            <a:r>
-              <a:rPr kumimoji="1" lang="en-US" altLang="zh-CN" dirty="0"/>
-              <a:t>used</a:t>
-            </a:r>
-            <a:r>
-              <a:rPr kumimoji="1" lang="zh-CN" altLang="en-US" dirty="0"/>
-              <a:t> </a:t>
-            </a:r>
-            <a:r>
-              <a:rPr kumimoji="1" lang="en-US" altLang="zh-CN" dirty="0"/>
-              <a:t>widely</a:t>
-            </a:r>
-            <a:r>
-              <a:rPr kumimoji="1" lang="zh-CN" altLang="en-US" dirty="0"/>
-              <a:t> </a:t>
-            </a:r>
-            <a:r>
-              <a:rPr kumimoji="1" lang="en-US" altLang="zh-CN" dirty="0"/>
-              <a:t>in</a:t>
-            </a:r>
-            <a:r>
-              <a:rPr kumimoji="1" lang="zh-CN" altLang="en-US" dirty="0"/>
-              <a:t> </a:t>
-            </a:r>
-            <a:r>
-              <a:rPr kumimoji="1" lang="en-US" altLang="zh-CN" dirty="0"/>
-              <a:t>modern</a:t>
-            </a:r>
-            <a:r>
-              <a:rPr kumimoji="1" lang="zh-CN" altLang="en-US" dirty="0"/>
-              <a:t> </a:t>
-            </a:r>
-            <a:r>
-              <a:rPr kumimoji="1" lang="en-US" altLang="zh-CN" dirty="0"/>
-              <a:t>languages</a:t>
+              <a:t>be</a:t>
+            </a:r>
+            <a:r>
+              <a:rPr kumimoji="1" lang="zh-CN" altLang="en-US" dirty="0"/>
+              <a:t> </a:t>
+            </a:r>
+            <a:r>
+              <a:rPr kumimoji="1" lang="en-US" altLang="zh-CN" dirty="0"/>
+              <a:t>generalized.</a:t>
+            </a:r>
+            <a:r>
+              <a:rPr kumimoji="1" lang="zh-CN" altLang="en-US" dirty="0"/>
+              <a:t> </a:t>
             </a:r>
           </a:p>
         </p:txBody>
@@ -7138,7 +6985,7 @@
     </p:spTree>
     <p:extLst>
       <p:ext uri="{BB962C8B-B14F-4D97-AF65-F5344CB8AC3E}">
-        <p14:creationId xmlns:p14="http://schemas.microsoft.com/office/powerpoint/2010/main" val="4152586416"/>
+        <p14:creationId xmlns:p14="http://schemas.microsoft.com/office/powerpoint/2010/main" val="233872336"/>
       </p:ext>
     </p:extLst>
   </p:cSld>
@@ -7424,6 +7271,265 @@
     <p:extLst>
       <p:ext uri="{BB962C8B-B14F-4D97-AF65-F5344CB8AC3E}">
         <p14:creationId xmlns:p14="http://schemas.microsoft.com/office/powerpoint/2010/main" val="2419700050"/>
+      </p:ext>
+    </p:extLst>
+  </p:cSld>
+  <p:clrMapOvr>
+    <a:masterClrMapping/>
+  </p:clrMapOvr>
+</p:sld>
+</file>
+
+<file path=ppt/slides/slide20.xml><?xml version="1.0" encoding="utf-8"?>
+<p:sld xmlns:a="http://schemas.openxmlformats.org/drawingml/2006/main" xmlns:r="http://schemas.openxmlformats.org/officeDocument/2006/relationships" xmlns:p="http://schemas.openxmlformats.org/presentationml/2006/main">
+  <p:cSld>
+    <p:spTree>
+      <p:nvGrpSpPr>
+        <p:cNvPr id="1" name=""/>
+        <p:cNvGrpSpPr/>
+        <p:nvPr/>
+      </p:nvGrpSpPr>
+      <p:grpSpPr>
+        <a:xfrm>
+          <a:off x="0" y="0"/>
+          <a:ext cx="0" cy="0"/>
+          <a:chOff x="0" y="0"/>
+          <a:chExt cx="0" cy="0"/>
+        </a:xfrm>
+      </p:grpSpPr>
+      <p:sp>
+        <p:nvSpPr>
+          <p:cNvPr id="2" name="标题 1">
+            <a:extLst>
+              <a:ext uri="{FF2B5EF4-FFF2-40B4-BE49-F238E27FC236}">
+                <a16:creationId xmlns:a16="http://schemas.microsoft.com/office/drawing/2014/main" id="{91A7BC32-210A-B647-A3FC-FBFCA80FC6BA}"/>
+              </a:ext>
+            </a:extLst>
+          </p:cNvPr>
+          <p:cNvSpPr>
+            <a:spLocks noGrp="1"/>
+          </p:cNvSpPr>
+          <p:nvPr>
+            <p:ph type="title"/>
+          </p:nvPr>
+        </p:nvSpPr>
+        <p:spPr/>
+        <p:txBody>
+          <a:bodyPr/>
+          <a:lstStyle/>
+          <a:p>
+            <a:r>
+              <a:rPr kumimoji="1" lang="en-US" altLang="zh-CN" dirty="0"/>
+              <a:t>Summary</a:t>
+            </a:r>
+            <a:endParaRPr kumimoji="1" lang="zh-CN" altLang="en-US" dirty="0"/>
+          </a:p>
+        </p:txBody>
+      </p:sp>
+      <p:sp>
+        <p:nvSpPr>
+          <p:cNvPr id="3" name="内容占位符 2">
+            <a:extLst>
+              <a:ext uri="{FF2B5EF4-FFF2-40B4-BE49-F238E27FC236}">
+                <a16:creationId xmlns:a16="http://schemas.microsoft.com/office/drawing/2014/main" id="{55A1BAFE-BD59-DA43-AA9F-E62E3841C011}"/>
+              </a:ext>
+            </a:extLst>
+          </p:cNvPr>
+          <p:cNvSpPr>
+            <a:spLocks noGrp="1"/>
+          </p:cNvSpPr>
+          <p:nvPr>
+            <p:ph idx="1"/>
+          </p:nvPr>
+        </p:nvSpPr>
+        <p:spPr/>
+        <p:txBody>
+          <a:bodyPr/>
+          <a:lstStyle/>
+          <a:p>
+            <a:r>
+              <a:rPr kumimoji="1" lang="en-US" altLang="zh-CN" dirty="0"/>
+              <a:t>Type</a:t>
+            </a:r>
+            <a:r>
+              <a:rPr kumimoji="1" lang="zh-CN" altLang="en-US" dirty="0"/>
+              <a:t> </a:t>
+            </a:r>
+            <a:r>
+              <a:rPr kumimoji="1" lang="en-US" altLang="zh-CN" dirty="0"/>
+              <a:t>reconstruction</a:t>
+            </a:r>
+            <a:r>
+              <a:rPr kumimoji="1" lang="zh-CN" altLang="en-US" dirty="0"/>
+              <a:t> </a:t>
+            </a:r>
+            <a:r>
+              <a:rPr kumimoji="1" lang="en-US" altLang="zh-CN" dirty="0"/>
+              <a:t>assigns</a:t>
+            </a:r>
+            <a:r>
+              <a:rPr kumimoji="1" lang="zh-CN" altLang="en-US" dirty="0"/>
+              <a:t> </a:t>
+            </a:r>
+            <a:r>
+              <a:rPr kumimoji="1" lang="en-US" altLang="zh-CN" dirty="0"/>
+              <a:t>types</a:t>
+            </a:r>
+            <a:r>
+              <a:rPr kumimoji="1" lang="zh-CN" altLang="en-US" dirty="0"/>
+              <a:t> </a:t>
+            </a:r>
+            <a:r>
+              <a:rPr kumimoji="1" lang="en-US" altLang="zh-CN" dirty="0"/>
+              <a:t>to</a:t>
+            </a:r>
+            <a:r>
+              <a:rPr kumimoji="1" lang="zh-CN" altLang="en-US" dirty="0"/>
+              <a:t> </a:t>
+            </a:r>
+            <a:r>
+              <a:rPr kumimoji="1" lang="en-US" altLang="zh-CN" dirty="0"/>
+              <a:t>type</a:t>
+            </a:r>
+            <a:r>
+              <a:rPr kumimoji="1" lang="zh-CN" altLang="en-US" dirty="0"/>
+              <a:t> </a:t>
+            </a:r>
+            <a:r>
+              <a:rPr kumimoji="1" lang="en-US" altLang="zh-CN" dirty="0"/>
+              <a:t>variables</a:t>
+            </a:r>
+          </a:p>
+          <a:p>
+            <a:r>
+              <a:rPr kumimoji="1" lang="en-US" altLang="zh-CN" dirty="0"/>
+              <a:t>Type</a:t>
+            </a:r>
+            <a:r>
+              <a:rPr kumimoji="1" lang="zh-CN" altLang="en-US" dirty="0"/>
+              <a:t> </a:t>
+            </a:r>
+            <a:r>
+              <a:rPr kumimoji="1" lang="en-US" altLang="zh-CN" dirty="0"/>
+              <a:t>inference</a:t>
+            </a:r>
+            <a:r>
+              <a:rPr kumimoji="1" lang="zh-CN" altLang="en-US" dirty="0"/>
+              <a:t> </a:t>
+            </a:r>
+            <a:r>
+              <a:rPr kumimoji="1" lang="en-US" altLang="zh-CN" dirty="0"/>
+              <a:t>infer</a:t>
+            </a:r>
+            <a:r>
+              <a:rPr kumimoji="1" lang="zh-CN" altLang="en-US" dirty="0"/>
+              <a:t> </a:t>
+            </a:r>
+            <a:r>
+              <a:rPr kumimoji="1" lang="en-US" altLang="zh-CN" dirty="0"/>
+              <a:t>(most</a:t>
+            </a:r>
+            <a:r>
+              <a:rPr kumimoji="1" lang="zh-CN" altLang="en-US" dirty="0"/>
+              <a:t> </a:t>
+            </a:r>
+            <a:r>
+              <a:rPr kumimoji="1" lang="en-US" altLang="zh-CN" dirty="0"/>
+              <a:t>general)</a:t>
+            </a:r>
+            <a:r>
+              <a:rPr kumimoji="1" lang="zh-CN" altLang="en-US" dirty="0"/>
+              <a:t> </a:t>
+            </a:r>
+            <a:r>
+              <a:rPr kumimoji="1" lang="en-US" altLang="zh-CN" dirty="0"/>
+              <a:t>types</a:t>
+            </a:r>
+            <a:r>
+              <a:rPr kumimoji="1" lang="zh-CN" altLang="en-US" dirty="0"/>
+              <a:t> </a:t>
+            </a:r>
+            <a:r>
+              <a:rPr kumimoji="1" lang="en-US" altLang="zh-CN" dirty="0"/>
+              <a:t>for</a:t>
+            </a:r>
+            <a:r>
+              <a:rPr kumimoji="1" lang="zh-CN" altLang="en-US" dirty="0"/>
+              <a:t> </a:t>
+            </a:r>
+            <a:r>
+              <a:rPr kumimoji="1" lang="en-US" altLang="zh-CN" dirty="0"/>
+              <a:t>untyped</a:t>
+            </a:r>
+            <a:r>
+              <a:rPr kumimoji="1" lang="zh-CN" altLang="en-US" dirty="0"/>
+              <a:t> </a:t>
+            </a:r>
+            <a:r>
+              <a:rPr kumimoji="1" lang="en-US" altLang="zh-CN" dirty="0"/>
+              <a:t>programs</a:t>
+            </a:r>
+          </a:p>
+          <a:p>
+            <a:r>
+              <a:rPr kumimoji="1" lang="en-US" altLang="zh-CN" dirty="0"/>
+              <a:t>Both</a:t>
+            </a:r>
+            <a:r>
+              <a:rPr kumimoji="1" lang="zh-CN" altLang="en-US" dirty="0"/>
+              <a:t> </a:t>
+            </a:r>
+            <a:r>
+              <a:rPr kumimoji="1" lang="en-US" altLang="zh-CN" dirty="0"/>
+              <a:t>are</a:t>
+            </a:r>
+            <a:r>
+              <a:rPr kumimoji="1" lang="zh-CN" altLang="en-US" dirty="0"/>
+              <a:t> </a:t>
+            </a:r>
+            <a:r>
+              <a:rPr kumimoji="1" lang="en-US" altLang="zh-CN" dirty="0"/>
+              <a:t>used</a:t>
+            </a:r>
+            <a:r>
+              <a:rPr kumimoji="1" lang="zh-CN" altLang="en-US" dirty="0"/>
+              <a:t> </a:t>
+            </a:r>
+            <a:r>
+              <a:rPr kumimoji="1" lang="en-US" altLang="zh-CN" dirty="0"/>
+              <a:t>widely</a:t>
+            </a:r>
+            <a:r>
+              <a:rPr kumimoji="1" lang="zh-CN" altLang="en-US" dirty="0"/>
+              <a:t> </a:t>
+            </a:r>
+            <a:r>
+              <a:rPr kumimoji="1" lang="en-US" altLang="zh-CN" dirty="0"/>
+              <a:t>in</a:t>
+            </a:r>
+            <a:r>
+              <a:rPr kumimoji="1" lang="zh-CN" altLang="en-US" dirty="0"/>
+              <a:t> </a:t>
+            </a:r>
+            <a:r>
+              <a:rPr kumimoji="1" lang="en-US" altLang="zh-CN" dirty="0"/>
+              <a:t>modern</a:t>
+            </a:r>
+            <a:r>
+              <a:rPr kumimoji="1" lang="zh-CN" altLang="en-US" dirty="0"/>
+              <a:t> </a:t>
+            </a:r>
+            <a:r>
+              <a:rPr kumimoji="1" lang="en-US" altLang="zh-CN" dirty="0"/>
+              <a:t>languages</a:t>
+            </a:r>
+          </a:p>
+        </p:txBody>
+      </p:sp>
+    </p:spTree>
+    <p:extLst>
+      <p:ext uri="{BB962C8B-B14F-4D97-AF65-F5344CB8AC3E}">
+        <p14:creationId xmlns:p14="http://schemas.microsoft.com/office/powerpoint/2010/main" val="4152586416"/>
       </p:ext>
     </p:extLst>
   </p:cSld>

</xml_diff>